<commit_message>
upgrade to Revit 2016
</commit_message>
<xml_diff>
--- a/Presentation/0_Revit_Programming_Training_Class.pptx
+++ b/Presentation/0_Revit_Programming_Training_Class.pptx
@@ -264,7 +264,7 @@
               <a:pPr>
                 <a:defRPr/>
               </a:pPr>
-              <a:t>4/22/2014</a:t>
+              <a:t>2/3/2015</a:t>
             </a:fld>
             <a:endParaRPr lang="en-US"/>
           </a:p>
@@ -487,7 +487,7 @@
               <a:pPr>
                 <a:defRPr/>
               </a:pPr>
-              <a:t>4/22/2014</a:t>
+              <a:t>2/3/2015</a:t>
             </a:fld>
             <a:endParaRPr lang="en-US"/>
           </a:p>
@@ -2703,7 +2703,7 @@
             </a:r>
             <a:r>
               <a:rPr lang="en-GB" sz="2000" dirty="0" smtClean="0"/>
-              <a:t>2014 </a:t>
+              <a:t>2015 </a:t>
             </a:r>
             <a:endParaRPr lang="en-GB" sz="2000" dirty="0" smtClean="0"/>
           </a:p>
@@ -4190,30 +4190,6 @@
 </file>
 
 <file path=customXml/item1.xml><?xml version="1.0" encoding="utf-8"?>
-<p:properties xmlns:p="http://schemas.microsoft.com/office/2006/metadata/properties" xmlns:xsi="http://www.w3.org/2001/XMLSchema-instance">
-  <documentManagement>
-    <Image xmlns="f53a3603-67ad-45e2-accf-d44f8756b321">
-      <Url>https://share.autodesk.com/Marketing/catalog/PublishingImages/09_25_08_AEC_Title_01.jpg</Url>
-      <Description xsi:nil="true"/>
-    </Image>
-    <Date_x0020_Published xmlns="c8bab806-ca78-4cad-94f6-48e563f76e95">2009-05-14T07:00:00+00:00</Date_x0020_Published>
-    <Media_x0020_Description xmlns="c8bab806-ca78-4cad-94f6-48e563f76e95">AEC Industry Title Slide -- General Overview Version</Media_x0020_Description>
-    <Category xmlns="f53a3603-67ad-45e2-accf-d44f8756b321" xsi:nil="true"/>
-    <Business_x0020_and_x0020_Industry xmlns="f53a3603-67ad-45e2-accf-d44f8756b321">Industry PowerPoint Title Slides</Business_x0020_and_x0020_Industry>
-  </documentManagement>
-</p:properties>
-</file>
-
-<file path=customXml/item2.xml><?xml version="1.0" encoding="utf-8"?>
-<?mso-contentType ?>
-<FormTemplates xmlns="http://schemas.microsoft.com/sharepoint/v3/contenttype/forms">
-  <Display>DocumentLibraryForm</Display>
-  <Edit>DocumentLibraryForm</Edit>
-  <New>DocumentLibraryForm</New>
-</FormTemplates>
-</file>
-
-<file path=customXml/item3.xml><?xml version="1.0" encoding="utf-8"?>
 <ct:contentTypeSchema xmlns:ct="http://schemas.microsoft.com/office/2006/metadata/contentType" xmlns:ma="http://schemas.microsoft.com/office/2006/metadata/properties/metaAttributes" ct:_="" ma:_="" ma:contentTypeName="Creative Catalog" ma:contentTypeID="0x0101003D62B9A716C08244A68E1D56ED354A9500A7EFD4C2F324CA44B4E995A506E2E1CF" ma:contentTypeVersion="31" ma:contentTypeDescription="" ma:contentTypeScope="" ma:versionID="17bc19fc9bd490bc1bda444d86d6b7f0">
   <xsd:schema xmlns:xsd="http://www.w3.org/2001/XMLSchema" xmlns:p="http://schemas.microsoft.com/office/2006/metadata/properties" xmlns:ns2="c8bab806-ca78-4cad-94f6-48e563f76e95" xmlns:ns4="f53a3603-67ad-45e2-accf-d44f8756b321" targetNamespace="http://schemas.microsoft.com/office/2006/metadata/properties" ma:root="true" ma:fieldsID="284905265c583129f8035dc0f09dfb0f" ns2:_="" ns4:_="">
     <xsd:import namespace="c8bab806-ca78-4cad-94f6-48e563f76e95"/>
@@ -4312,31 +4288,31 @@
 </ct:contentTypeSchema>
 </file>
 
-<file path=customXml/itemProps1.xml><?xml version="1.0" encoding="utf-8"?>
-<ds:datastoreItem xmlns:ds="http://schemas.openxmlformats.org/officeDocument/2006/customXml" ds:itemID="{6307AE55-A139-4AD7-ACEE-00E455099D23}">
-  <ds:schemaRefs>
-    <ds:schemaRef ds:uri="http://purl.org/dc/dcmitype/"/>
-    <ds:schemaRef ds:uri="http://schemas.microsoft.com/office/2006/metadata/properties"/>
-    <ds:schemaRef ds:uri="http://schemas.microsoft.com/office/2006/documentManagement/types"/>
-    <ds:schemaRef ds:uri="http://www.w3.org/XML/1998/namespace"/>
-    <ds:schemaRef ds:uri="f53a3603-67ad-45e2-accf-d44f8756b321"/>
-    <ds:schemaRef ds:uri="http://schemas.openxmlformats.org/package/2006/metadata/core-properties"/>
-    <ds:schemaRef ds:uri="c8bab806-ca78-4cad-94f6-48e563f76e95"/>
-    <ds:schemaRef ds:uri="http://purl.org/dc/terms/"/>
-    <ds:schemaRef ds:uri="http://purl.org/dc/elements/1.1/"/>
-  </ds:schemaRefs>
-</ds:datastoreItem>
+<file path=customXml/item2.xml><?xml version="1.0" encoding="utf-8"?>
+<?mso-contentType ?>
+<FormTemplates xmlns="http://schemas.microsoft.com/sharepoint/v3/contenttype/forms">
+  <Display>DocumentLibraryForm</Display>
+  <Edit>DocumentLibraryForm</Edit>
+  <New>DocumentLibraryForm</New>
+</FormTemplates>
 </file>
 
-<file path=customXml/itemProps2.xml><?xml version="1.0" encoding="utf-8"?>
-<ds:datastoreItem xmlns:ds="http://schemas.openxmlformats.org/officeDocument/2006/customXml" ds:itemID="{1B23F64D-CA4A-4BF5-9636-FF31814D07BC}">
-  <ds:schemaRefs>
-    <ds:schemaRef ds:uri="http://schemas.microsoft.com/sharepoint/v3/contenttype/forms"/>
-  </ds:schemaRefs>
-</ds:datastoreItem>
+<file path=customXml/item3.xml><?xml version="1.0" encoding="utf-8"?>
+<p:properties xmlns:p="http://schemas.microsoft.com/office/2006/metadata/properties" xmlns:xsi="http://www.w3.org/2001/XMLSchema-instance">
+  <documentManagement>
+    <Image xmlns="f53a3603-67ad-45e2-accf-d44f8756b321">
+      <Url>https://share.autodesk.com/Marketing/catalog/PublishingImages/09_25_08_AEC_Title_01.jpg</Url>
+      <Description xsi:nil="true"/>
+    </Image>
+    <Date_x0020_Published xmlns="c8bab806-ca78-4cad-94f6-48e563f76e95">2009-05-14T07:00:00+00:00</Date_x0020_Published>
+    <Media_x0020_Description xmlns="c8bab806-ca78-4cad-94f6-48e563f76e95">AEC Industry Title Slide -- General Overview Version</Media_x0020_Description>
+    <Category xmlns="f53a3603-67ad-45e2-accf-d44f8756b321" xsi:nil="true"/>
+    <Business_x0020_and_x0020_Industry xmlns="f53a3603-67ad-45e2-accf-d44f8756b321">Industry PowerPoint Title Slides</Business_x0020_and_x0020_Industry>
+  </documentManagement>
+</p:properties>
 </file>
 
-<file path=customXml/itemProps3.xml><?xml version="1.0" encoding="utf-8"?>
+<file path=customXml/itemProps1.xml><?xml version="1.0" encoding="utf-8"?>
 <ds:datastoreItem xmlns:ds="http://schemas.openxmlformats.org/officeDocument/2006/customXml" ds:itemID="{A9644739-F05B-4EE2-A361-57034C614130}">
   <ds:schemaRefs>
     <ds:schemaRef ds:uri="http://schemas.microsoft.com/office/2006/metadata/contentType"/>
@@ -4352,4 +4328,28 @@
     <ds:schemaRef ds:uri="http://schemas.microsoft.com/office/internal/2005/internalDocumentation"/>
   </ds:schemaRefs>
 </ds:datastoreItem>
+</file>
+
+<file path=customXml/itemProps2.xml><?xml version="1.0" encoding="utf-8"?>
+<ds:datastoreItem xmlns:ds="http://schemas.openxmlformats.org/officeDocument/2006/customXml" ds:itemID="{1B23F64D-CA4A-4BF5-9636-FF31814D07BC}">
+  <ds:schemaRefs>
+    <ds:schemaRef ds:uri="http://schemas.microsoft.com/sharepoint/v3/contenttype/forms"/>
+  </ds:schemaRefs>
+</ds:datastoreItem>
+</file>
+
+<file path=customXml/itemProps3.xml><?xml version="1.0" encoding="utf-8"?>
+<ds:datastoreItem xmlns:ds="http://schemas.openxmlformats.org/officeDocument/2006/customXml" ds:itemID="{6307AE55-A139-4AD7-ACEE-00E455099D23}">
+  <ds:schemaRefs>
+    <ds:schemaRef ds:uri="http://purl.org/dc/dcmitype/"/>
+    <ds:schemaRef ds:uri="http://schemas.microsoft.com/office/2006/metadata/properties"/>
+    <ds:schemaRef ds:uri="http://schemas.microsoft.com/office/2006/documentManagement/types"/>
+    <ds:schemaRef ds:uri="http://www.w3.org/XML/1998/namespace"/>
+    <ds:schemaRef ds:uri="f53a3603-67ad-45e2-accf-d44f8756b321"/>
+    <ds:schemaRef ds:uri="http://schemas.openxmlformats.org/package/2006/metadata/core-properties"/>
+    <ds:schemaRef ds:uri="c8bab806-ca78-4cad-94f6-48e563f76e95"/>
+    <ds:schemaRef ds:uri="http://purl.org/dc/terms/"/>
+    <ds:schemaRef ds:uri="http://purl.org/dc/elements/1.1/"/>
+  </ds:schemaRefs>
+</ds:datastoreItem>
 </file>
</xml_diff>

<commit_message>
updated slide decks for holger schulz
</commit_message>
<xml_diff>
--- a/Presentation/0_Revit_Programming_Training_Class.pptx
+++ b/Presentation/0_Revit_Programming_Training_Class.pptx
@@ -294,7 +294,7 @@
               <a:pPr>
                 <a:defRPr/>
               </a:pPr>
-              <a:t>10/19/16</a:t>
+              <a:t>2/29/20</a:t>
             </a:fld>
             <a:endParaRPr lang="en-US"/>
           </a:p>
@@ -517,7 +517,7 @@
               <a:pPr>
                 <a:defRPr/>
               </a:pPr>
-              <a:t>10/19/16</a:t>
+              <a:t>2/29/20</a:t>
             </a:fld>
             <a:endParaRPr lang="en-US"/>
           </a:p>
@@ -584,38 +584,37 @@
           <a:p>
             <a:pPr lvl="0"/>
             <a:r>
-              <a:rPr lang="en-US" noProof="0" dirty="0" smtClean="0"/>
+              <a:rPr lang="en-US" noProof="0" dirty="0"/>
               <a:t>Click to edit Master text styles</a:t>
             </a:r>
           </a:p>
           <a:p>
             <a:pPr lvl="1"/>
             <a:r>
-              <a:rPr lang="en-US" noProof="0" dirty="0" smtClean="0"/>
+              <a:rPr lang="en-US" noProof="0" dirty="0"/>
               <a:t>Second level</a:t>
             </a:r>
           </a:p>
           <a:p>
             <a:pPr lvl="2"/>
             <a:r>
-              <a:rPr lang="en-US" noProof="0" dirty="0" smtClean="0"/>
+              <a:rPr lang="en-US" noProof="0" dirty="0"/>
               <a:t>Third level</a:t>
             </a:r>
           </a:p>
           <a:p>
             <a:pPr lvl="3"/>
             <a:r>
-              <a:rPr lang="en-US" noProof="0" dirty="0" smtClean="0"/>
+              <a:rPr lang="en-US" noProof="0" dirty="0"/>
               <a:t>Fourth level</a:t>
             </a:r>
           </a:p>
           <a:p>
             <a:pPr lvl="4"/>
             <a:r>
-              <a:rPr lang="en-US" noProof="0" dirty="0" smtClean="0"/>
+              <a:rPr lang="en-US" noProof="0" dirty="0"/>
               <a:t>Fifth level</a:t>
             </a:r>
-            <a:endParaRPr lang="en-US" noProof="0" dirty="0"/>
           </a:p>
         </p:txBody>
       </p:sp>
@@ -894,7 +893,7 @@
           <a:lstStyle/>
           <a:p>
             <a:r>
-              <a:rPr lang="en-US" dirty="0" smtClean="0"/>
+              <a:rPr lang="en-US" dirty="0"/>
               <a:t>AEC Title</a:t>
             </a:r>
           </a:p>
@@ -971,7 +970,7 @@
               <a:pPr/>
               <a:t>2</a:t>
             </a:fld>
-            <a:endParaRPr lang="en-US" smtClean="0"/>
+            <a:endParaRPr lang="en-US"/>
           </a:p>
         </p:txBody>
       </p:sp>
@@ -1012,7 +1011,7 @@
           <a:lstStyle/>
           <a:p>
             <a:pPr eaLnBrk="1" hangingPunct="1"/>
-            <a:endParaRPr lang="en-GB" smtClean="0"/>
+            <a:endParaRPr lang="en-GB"/>
           </a:p>
         </p:txBody>
       </p:sp>
@@ -1063,7 +1062,7 @@
               <a:pPr/>
               <a:t>3</a:t>
             </a:fld>
-            <a:endParaRPr lang="en-US" smtClean="0"/>
+            <a:endParaRPr lang="en-US"/>
           </a:p>
         </p:txBody>
       </p:sp>
@@ -1105,42 +1104,42 @@
           <a:p>
             <a:pPr eaLnBrk="1" hangingPunct="1"/>
             <a:r>
-              <a:rPr lang="en-US" dirty="0" smtClean="0"/>
+              <a:rPr lang="en-US" dirty="0"/>
               <a:t>We are running in low resolution today, so that we can switch back and forth between the presentation and live demos.</a:t>
             </a:r>
           </a:p>
           <a:p>
             <a:pPr eaLnBrk="1" hangingPunct="1"/>
             <a:r>
-              <a:rPr lang="en-US" dirty="0" smtClean="0"/>
+              <a:rPr lang="en-US" dirty="0"/>
               <a:t>So, what are the initial steps in creating a Revit application?</a:t>
             </a:r>
           </a:p>
           <a:p>
             <a:pPr eaLnBrk="1" hangingPunct="1"/>
             <a:r>
-              <a:rPr lang="en-US" dirty="0" smtClean="0"/>
+              <a:rPr lang="en-US" dirty="0"/>
               <a:t>The first thing is to understand is what is installed, the API architecture, the information provided and where to obtain more information.</a:t>
             </a:r>
           </a:p>
           <a:p>
             <a:pPr eaLnBrk="1" hangingPunct="1"/>
             <a:r>
-              <a:rPr lang="en-US" dirty="0" smtClean="0"/>
+              <a:rPr lang="en-US" dirty="0"/>
               <a:t>Then we explore how to set up the development environment and create a first "Hello world" type application.</a:t>
             </a:r>
           </a:p>
           <a:p>
             <a:pPr eaLnBrk="1" hangingPunct="1"/>
             <a:r>
-              <a:rPr lang="en-US" dirty="0" smtClean="0"/>
+              <a:rPr lang="en-US" dirty="0"/>
               <a:t>After that, we will look into the Revit database structure and its data and elements.</a:t>
             </a:r>
           </a:p>
           <a:p>
             <a:pPr eaLnBrk="1" hangingPunct="1"/>
             <a:r>
-              <a:rPr lang="en-US" dirty="0" smtClean="0"/>
+              <a:rPr lang="en-US" dirty="0"/>
               <a:t>The samples provide a valuable knowledgebase on how to solve Revit programming tasks.</a:t>
             </a:r>
           </a:p>
@@ -1241,6 +1240,90 @@
 </p:notes>
 </file>
 
+<file path=ppt/notesSlides/notesSlide5.xml><?xml version="1.0" encoding="utf-8"?>
+<p:notes xmlns:a="http://schemas.openxmlformats.org/drawingml/2006/main" xmlns:r="http://schemas.openxmlformats.org/officeDocument/2006/relationships" xmlns:p="http://schemas.openxmlformats.org/presentationml/2006/main">
+  <p:cSld>
+    <p:spTree>
+      <p:nvGrpSpPr>
+        <p:cNvPr id="1" name=""/>
+        <p:cNvGrpSpPr/>
+        <p:nvPr/>
+      </p:nvGrpSpPr>
+      <p:grpSpPr>
+        <a:xfrm>
+          <a:off x="0" y="0"/>
+          <a:ext cx="0" cy="0"/>
+          <a:chOff x="0" y="0"/>
+          <a:chExt cx="0" cy="0"/>
+        </a:xfrm>
+      </p:grpSpPr>
+      <p:sp>
+        <p:nvSpPr>
+          <p:cNvPr id="2" name="Slide Image Placeholder 1"/>
+          <p:cNvSpPr>
+            <a:spLocks noGrp="1" noRot="1" noChangeAspect="1"/>
+          </p:cNvSpPr>
+          <p:nvPr>
+            <p:ph type="sldImg"/>
+          </p:nvPr>
+        </p:nvSpPr>
+        <p:spPr/>
+      </p:sp>
+      <p:sp>
+        <p:nvSpPr>
+          <p:cNvPr id="3" name="Notes Placeholder 2"/>
+          <p:cNvSpPr>
+            <a:spLocks noGrp="1"/>
+          </p:cNvSpPr>
+          <p:nvPr>
+            <p:ph type="body" idx="1"/>
+          </p:nvPr>
+        </p:nvSpPr>
+        <p:spPr/>
+        <p:txBody>
+          <a:bodyPr/>
+          <a:lstStyle/>
+          <a:p>
+            <a:endParaRPr lang="en-US"/>
+          </a:p>
+        </p:txBody>
+      </p:sp>
+      <p:sp>
+        <p:nvSpPr>
+          <p:cNvPr id="4" name="Slide Number Placeholder 3"/>
+          <p:cNvSpPr>
+            <a:spLocks noGrp="1"/>
+          </p:cNvSpPr>
+          <p:nvPr>
+            <p:ph type="sldNum" sz="quarter" idx="10"/>
+          </p:nvPr>
+        </p:nvSpPr>
+        <p:spPr/>
+        <p:txBody>
+          <a:bodyPr/>
+          <a:lstStyle/>
+          <a:p>
+            <a:fld id="{73E9330B-B1DA-214B-A229-0CB8492B91A5}" type="slidenum">
+              <a:rPr lang="en-US" smtClean="0"/>
+              <a:t>5</a:t>
+            </a:fld>
+            <a:endParaRPr lang="en-US" dirty="0"/>
+          </a:p>
+        </p:txBody>
+      </p:sp>
+    </p:spTree>
+    <p:extLst>
+      <p:ext uri="{BB962C8B-B14F-4D97-AF65-F5344CB8AC3E}">
+        <p14:creationId xmlns:p14="http://schemas.microsoft.com/office/powerpoint/2010/main" val="1790401262"/>
+      </p:ext>
+    </p:extLst>
+  </p:cSld>
+  <p:clrMapOvr>
+    <a:masterClrMapping/>
+  </p:clrMapOvr>
+</p:notes>
+</file>
+
 <file path=ppt/slideLayouts/slideLayout1.xml><?xml version="1.0" encoding="utf-8"?>
 <p:sldLayout xmlns:a="http://schemas.openxmlformats.org/drawingml/2006/main" xmlns:r="http://schemas.openxmlformats.org/officeDocument/2006/relationships" xmlns:p="http://schemas.openxmlformats.org/presentationml/2006/main" type="obj" preserve="1">
   <p:cSld name="Title and Content">
@@ -1278,7 +1361,7 @@
           </a:lstStyle>
           <a:p>
             <a:r>
-              <a:rPr lang="en-US" smtClean="0"/>
+              <a:rPr lang="en-US"/>
               <a:t>Click to edit Master title style</a:t>
             </a:r>
             <a:endParaRPr lang="en-US" dirty="0"/>
@@ -1331,182 +1414,64 @@
           <a:p>
             <a:pPr lvl="0"/>
             <a:r>
-              <a:rPr lang="en-US" smtClean="0"/>
+              <a:rPr lang="en-US"/>
               <a:t>Click to edit Master text styles</a:t>
             </a:r>
           </a:p>
           <a:p>
             <a:pPr lvl="1"/>
             <a:r>
-              <a:rPr lang="en-US" smtClean="0"/>
+              <a:rPr lang="en-US"/>
               <a:t>Second level</a:t>
             </a:r>
           </a:p>
           <a:p>
             <a:pPr lvl="2"/>
             <a:r>
-              <a:rPr lang="en-US" smtClean="0"/>
+              <a:rPr lang="en-US"/>
               <a:t>Third level</a:t>
             </a:r>
           </a:p>
           <a:p>
             <a:pPr lvl="3"/>
             <a:r>
-              <a:rPr lang="en-US" smtClean="0"/>
+              <a:rPr lang="en-US"/>
               <a:t>Fourth level</a:t>
             </a:r>
           </a:p>
           <a:p>
             <a:pPr lvl="4"/>
             <a:r>
-              <a:rPr lang="en-US" smtClean="0"/>
+              <a:rPr lang="en-US"/>
               <a:t>Fifth level</a:t>
             </a:r>
             <a:endParaRPr lang="en-US" dirty="0"/>
           </a:p>
         </p:txBody>
       </p:sp>
-      <p:sp>
-        <p:nvSpPr>
-          <p:cNvPr id="4" name="Rectangle 3"/>
-          <p:cNvSpPr/>
-          <p:nvPr userDrawn="1"/>
-        </p:nvSpPr>
-        <p:spPr>
-          <a:xfrm>
-            <a:off x="0" y="9355137"/>
-            <a:ext cx="13011150" cy="400050"/>
-          </a:xfrm>
-          <a:prstGeom prst="rect">
-            <a:avLst/>
-          </a:prstGeom>
-          <a:solidFill>
-            <a:schemeClr val="bg1"/>
-          </a:solidFill>
-          <a:ln>
-            <a:noFill/>
-          </a:ln>
-        </p:spPr>
-        <p:style>
-          <a:lnRef idx="1">
-            <a:schemeClr val="accent1"/>
-          </a:lnRef>
-          <a:fillRef idx="3">
-            <a:schemeClr val="accent1"/>
-          </a:fillRef>
-          <a:effectRef idx="2">
-            <a:schemeClr val="accent1"/>
-          </a:effectRef>
-          <a:fontRef idx="minor">
-            <a:schemeClr val="lt1"/>
-          </a:fontRef>
-        </p:style>
-        <p:txBody>
-          <a:bodyPr lIns="57594" tIns="28797" rIns="57594" bIns="28797" rtlCol="0" anchor="ctr"/>
-          <a:lstStyle/>
-          <a:p>
-            <a:pPr algn="ctr"/>
-            <a:endParaRPr lang="en-US"/>
-          </a:p>
-        </p:txBody>
-      </p:sp>
-      <p:sp>
-        <p:nvSpPr>
-          <p:cNvPr id="5" name="TextBox 4"/>
-          <p:cNvSpPr txBox="1"/>
-          <p:nvPr userDrawn="1"/>
-        </p:nvSpPr>
-        <p:spPr>
-          <a:xfrm>
-            <a:off x="180975" y="9512414"/>
-            <a:ext cx="1558815" cy="138499"/>
-          </a:xfrm>
-          <a:prstGeom prst="rect">
-            <a:avLst/>
-          </a:prstGeom>
-          <a:noFill/>
-        </p:spPr>
-        <p:txBody>
-          <a:bodyPr wrap="square" lIns="0" tIns="0" rIns="0" bIns="0" rtlCol="0">
-            <a:spAutoFit/>
-          </a:bodyPr>
-          <a:lstStyle/>
-          <a:p>
-            <a:r>
-              <a:rPr lang="en-US" sz="900" b="0" i="0" dirty="0" smtClean="0">
-                <a:solidFill>
-                  <a:schemeClr val="tx1">
-                    <a:lumMod val="65000"/>
-                    <a:lumOff val="35000"/>
-                  </a:schemeClr>
-                </a:solidFill>
-                <a:latin typeface="Frutiger Next LT W1G"/>
-                <a:cs typeface="Frutiger Next LT W1G"/>
-              </a:rPr>
-              <a:t>© 2014 Autodesk</a:t>
-            </a:r>
-            <a:endParaRPr lang="en-US" sz="900" b="0" i="0" dirty="0">
-              <a:solidFill>
-                <a:schemeClr val="tx1">
-                  <a:lumMod val="65000"/>
-                  <a:lumOff val="35000"/>
-                </a:schemeClr>
-              </a:solidFill>
-              <a:latin typeface="Frutiger Next LT W1G"/>
-              <a:cs typeface="Frutiger Next LT W1G"/>
-            </a:endParaRPr>
-          </a:p>
-        </p:txBody>
-      </p:sp>
-      <p:pic>
-        <p:nvPicPr>
-          <p:cNvPr id="6" name="Picture 5" descr="autodesk-logo-rgb-color-logo-black-text-large.png"/>
-          <p:cNvPicPr>
-            <a:picLocks noChangeAspect="1"/>
-          </p:cNvPicPr>
-          <p:nvPr userDrawn="1"/>
-        </p:nvPicPr>
-        <p:blipFill>
-          <a:blip r:embed="rId2" cstate="screen">
-            <a:extLst>
-              <a:ext uri="{28A0092B-C50C-407E-A947-70E740481C1C}">
-                <a14:useLocalDpi xmlns:a14="http://schemas.microsoft.com/office/drawing/2010/main"/>
-              </a:ext>
-            </a:extLst>
-          </a:blip>
-          <a:stretch>
-            <a:fillRect/>
-          </a:stretch>
-        </p:blipFill>
-        <p:spPr>
-          <a:xfrm>
-            <a:off x="11861374" y="9489044"/>
-            <a:ext cx="1105051" cy="185240"/>
-          </a:xfrm>
-          <a:prstGeom prst="rect">
-            <a:avLst/>
-          </a:prstGeom>
-        </p:spPr>
-      </p:pic>
     </p:spTree>
   </p:cSld>
   <p:clrMapOvr>
     <a:masterClrMapping/>
   </p:clrMapOvr>
   <p:transition/>
-  <p:timing>
-    <p:tnLst>
-      <p:par>
-        <p:cTn id="1" dur="indefinite" restart="never" nodeType="tmRoot"/>
-      </p:par>
-    </p:tnLst>
-  </p:timing>
 </p:sldLayout>
 </file>
 
 <file path=ppt/slideLayouts/slideLayout2.xml><?xml version="1.0" encoding="utf-8"?>
-<p:sldLayout xmlns:a="http://schemas.openxmlformats.org/drawingml/2006/main" xmlns:r="http://schemas.openxmlformats.org/officeDocument/2006/relationships" xmlns:p="http://schemas.openxmlformats.org/presentationml/2006/main" preserve="1">
-  <p:cSld name="1_Custom Layout">
+<p:sldLayout xmlns:a="http://schemas.openxmlformats.org/drawingml/2006/main" xmlns:r="http://schemas.openxmlformats.org/officeDocument/2006/relationships" xmlns:p="http://schemas.openxmlformats.org/presentationml/2006/main" userDrawn="1">
+  <p:cSld name="Final">
+    <p:bg>
+      <p:bgPr>
+        <a:blipFill rotWithShape="1">
+          <a:blip r:embed="rId2"/>
+          <a:stretch>
+            <a:fillRect/>
+          </a:stretch>
+        </a:blipFill>
+        <a:effectLst/>
+      </p:bgPr>
+    </p:bg>
     <p:spTree>
       <p:nvGrpSpPr>
         <p:cNvPr id="1" name=""/>
@@ -1523,100 +1488,56 @@
       </p:grpSpPr>
       <p:sp>
         <p:nvSpPr>
-          <p:cNvPr id="4" name="TextBox 3"/>
-          <p:cNvSpPr txBox="1"/>
-          <p:nvPr/>
+          <p:cNvPr id="3" name="Text Placeholder 2"/>
+          <p:cNvSpPr>
+            <a:spLocks noGrp="1"/>
+          </p:cNvSpPr>
+          <p:nvPr>
+            <p:ph type="body" sz="quarter" idx="12" hasCustomPrompt="1"/>
+          </p:nvPr>
         </p:nvSpPr>
         <p:spPr>
           <a:xfrm>
-            <a:off x="314409" y="8588916"/>
-            <a:ext cx="12483151" cy="1000274"/>
+            <a:off x="105452" y="8251100"/>
+            <a:ext cx="12798977" cy="1000589"/>
           </a:xfrm>
           <a:prstGeom prst="rect">
             <a:avLst/>
           </a:prstGeom>
-          <a:noFill/>
         </p:spPr>
         <p:txBody>
-          <a:bodyPr wrap="square" lIns="0" tIns="0" rIns="0" bIns="0" rtlCol="0">
-            <a:spAutoFit/>
-          </a:bodyPr>
-          <a:lstStyle/>
-          <a:p>
-            <a:r>
-              <a:rPr lang="en-US" sz="1300" b="0" i="0" dirty="0" smtClean="0">
+          <a:bodyPr vert="horz" lIns="0" tIns="0" rIns="0" bIns="0" anchor="b" anchorCtr="0"/>
+          <a:lstStyle>
+            <a:lvl1pPr marL="0" indent="0">
+              <a:buNone/>
+              <a:defRPr sz="1000">
                 <a:solidFill>
-                  <a:schemeClr val="bg1">
-                    <a:lumMod val="65000"/>
-                  </a:schemeClr>
+                  <a:srgbClr val="595959"/>
                 </a:solidFill>
-                <a:latin typeface="Frutiger Next LT W1G"/>
-                <a:cs typeface="Frutiger Next LT W1G"/>
-              </a:rPr>
+              </a:defRPr>
+            </a:lvl1pPr>
+          </a:lstStyle>
+          <a:p>
+            <a:r>
+              <a:rPr lang="en-US" dirty="0"/>
               <a:t>Autodesk is a registered trademark of Autodesk, Inc., and/or its subsidiaries and/or affiliates in the USA and/or other countries. All other brand names, product names, or trademarks belong to their respective holders. Autodesk reserves the right to alter product and services offerings, and specifications and pricing at any time without notice, and is not responsible for typographical or graphical errors that may appear in this document.</a:t>
             </a:r>
-          </a:p>
-          <a:p>
-            <a:endParaRPr lang="en-US" sz="1300" b="0" i="0" dirty="0" smtClean="0">
-              <a:solidFill>
-                <a:schemeClr val="bg1">
-                  <a:lumMod val="65000"/>
-                </a:schemeClr>
-              </a:solidFill>
-              <a:latin typeface="Frutiger Next LT W1G"/>
-              <a:cs typeface="Frutiger Next LT W1G"/>
-            </a:endParaRPr>
-          </a:p>
-          <a:p>
-            <a:r>
-              <a:rPr lang="en-US" sz="1300" b="0" i="0" dirty="0" smtClean="0">
-                <a:solidFill>
-                  <a:schemeClr val="bg1">
-                    <a:lumMod val="65000"/>
-                  </a:schemeClr>
-                </a:solidFill>
-                <a:latin typeface="Frutiger Next LT W1G"/>
-                <a:cs typeface="Frutiger Next LT W1G"/>
-              </a:rPr>
-              <a:t>© 2014 Autodesk, Inc. All right</a:t>
-            </a:r>
-            <a:r>
-              <a:rPr lang="en-US" sz="1300" b="0" i="0" baseline="0" dirty="0" smtClean="0">
-                <a:solidFill>
-                  <a:schemeClr val="bg1">
-                    <a:lumMod val="65000"/>
-                  </a:schemeClr>
-                </a:solidFill>
-                <a:latin typeface="Frutiger Next LT W1G"/>
-                <a:cs typeface="Frutiger Next LT W1G"/>
-              </a:rPr>
-              <a:t>s reserved.</a:t>
-            </a:r>
-            <a:endParaRPr lang="en-US" sz="1300" b="0" i="0" dirty="0">
-              <a:solidFill>
-                <a:schemeClr val="bg1">
-                  <a:lumMod val="65000"/>
-                </a:schemeClr>
-              </a:solidFill>
-              <a:latin typeface="Frutiger Next LT W1G"/>
-              <a:cs typeface="Frutiger Next LT W1G"/>
-            </a:endParaRPr>
           </a:p>
         </p:txBody>
       </p:sp>
       <p:pic>
         <p:nvPicPr>
-          <p:cNvPr id="6" name="Picture 5" descr="autodesk-logo-rgb-color-logo-black-text-large.png"/>
+          <p:cNvPr id="4" name="Picture 3"/>
           <p:cNvPicPr>
             <a:picLocks noChangeAspect="1"/>
           </p:cNvPicPr>
-          <p:nvPr/>
+          <p:nvPr userDrawn="1"/>
         </p:nvPicPr>
         <p:blipFill>
-          <a:blip r:embed="rId2">
+          <a:blip r:embed="rId3">
             <a:extLst>
               <a:ext uri="{28A0092B-C50C-407E-A947-70E740481C1C}">
-                <a14:useLocalDpi xmlns:a14="http://schemas.microsoft.com/office/drawing/2010/main"/>
+                <a14:useLocalDpi xmlns:a14="http://schemas.microsoft.com/office/drawing/2010/main" val="0"/>
               </a:ext>
             </a:extLst>
           </a:blip>
@@ -1626,8 +1547,8 @@
         </p:blipFill>
         <p:spPr>
           <a:xfrm>
-            <a:off x="2103942" y="3942871"/>
-            <a:ext cx="8791832" cy="1473535"/>
+            <a:off x="1587428" y="3963987"/>
+            <a:ext cx="9228628" cy="1578324"/>
           </a:xfrm>
           <a:prstGeom prst="rect">
             <a:avLst/>
@@ -1637,22 +1558,13 @@
     </p:spTree>
     <p:extLst>
       <p:ext uri="{BB962C8B-B14F-4D97-AF65-F5344CB8AC3E}">
-        <p14:creationId xmlns:p14="http://schemas.microsoft.com/office/powerpoint/2010/main" val="3531202118"/>
+        <p14:creationId xmlns:p14="http://schemas.microsoft.com/office/powerpoint/2010/main" val="1586229626"/>
       </p:ext>
     </p:extLst>
   </p:cSld>
   <p:clrMapOvr>
     <a:masterClrMapping/>
   </p:clrMapOvr>
-  <p:transition/>
-  <p:timing>
-    <p:tnLst>
-      <p:par>
-        <p:cTn id="1" dur="indefinite" restart="never" nodeType="tmRoot"/>
-      </p:par>
-    </p:tnLst>
-  </p:timing>
-  <p:hf sldNum="0" hdr="0" dt="0"/>
 </p:sldLayout>
 </file>
 
@@ -1681,6 +1593,36 @@
           <a:chExt cx="0" cy="0"/>
         </a:xfrm>
       </p:grpSpPr>
+      <p:pic>
+        <p:nvPicPr>
+          <p:cNvPr id="2" name="Picture 1" descr="footer_2014.png"/>
+          <p:cNvPicPr>
+            <a:picLocks noChangeAspect="1"/>
+          </p:cNvPicPr>
+          <p:nvPr userDrawn="1"/>
+        </p:nvPicPr>
+        <p:blipFill>
+          <a:blip r:embed="rId4">
+            <a:extLst>
+              <a:ext uri="{28A0092B-C50C-407E-A947-70E740481C1C}">
+                <a14:useLocalDpi xmlns:a14="http://schemas.microsoft.com/office/drawing/2010/main" val="0"/>
+              </a:ext>
+            </a:extLst>
+          </a:blip>
+          <a:stretch>
+            <a:fillRect/>
+          </a:stretch>
+        </p:blipFill>
+        <p:spPr>
+          <a:xfrm>
+            <a:off x="0" y="9057784"/>
+            <a:ext cx="13011150" cy="773603"/>
+          </a:xfrm>
+          <a:prstGeom prst="rect">
+            <a:avLst/>
+          </a:prstGeom>
+        </p:spPr>
+      </p:pic>
       <p:sp>
         <p:nvSpPr>
           <p:cNvPr id="1026" name="Rectangle 1"/>
@@ -1717,12 +1659,12 @@
           <a:p>
             <a:pPr lvl="0"/>
             <a:r>
-              <a:rPr lang="en-US" smtClean="0">
+              <a:rPr lang="en-US">
                 <a:sym typeface="Arial" pitchFamily="34" charset="0"/>
               </a:rPr>
               <a:t>Click to edit Master title style</a:t>
             </a:r>
-            <a:endParaRPr lang="en-US" dirty="0" smtClean="0">
+            <a:endParaRPr lang="en-US" dirty="0">
               <a:sym typeface="Arial" pitchFamily="34" charset="0"/>
             </a:endParaRPr>
           </a:p>
@@ -1764,7 +1706,7 @@
           <a:p>
             <a:pPr lvl="0"/>
             <a:r>
-              <a:rPr lang="en-US" smtClean="0">
+              <a:rPr lang="en-US">
                 <a:sym typeface="Arial" pitchFamily="34" charset="0"/>
               </a:rPr>
               <a:t>Click to edit Master text styles</a:t>
@@ -1773,7 +1715,7 @@
           <a:p>
             <a:pPr lvl="1"/>
             <a:r>
-              <a:rPr lang="en-US" smtClean="0">
+              <a:rPr lang="en-US">
                 <a:sym typeface="Arial" pitchFamily="34" charset="0"/>
               </a:rPr>
               <a:t>Second level</a:t>
@@ -1782,7 +1724,7 @@
           <a:p>
             <a:pPr lvl="2"/>
             <a:r>
-              <a:rPr lang="en-US" smtClean="0">
+              <a:rPr lang="en-US">
                 <a:sym typeface="Arial" pitchFamily="34" charset="0"/>
               </a:rPr>
               <a:t>Third level</a:t>
@@ -1791,7 +1733,7 @@
           <a:p>
             <a:pPr lvl="3"/>
             <a:r>
-              <a:rPr lang="en-US" smtClean="0">
+              <a:rPr lang="en-US">
                 <a:sym typeface="Arial" pitchFamily="34" charset="0"/>
               </a:rPr>
               <a:t>Fourth level</a:t>
@@ -1800,14 +1742,57 @@
           <a:p>
             <a:pPr lvl="4"/>
             <a:r>
-              <a:rPr lang="en-US" smtClean="0">
+              <a:rPr lang="en-US">
                 <a:sym typeface="Arial" pitchFamily="34" charset="0"/>
               </a:rPr>
               <a:t>Fifth level</a:t>
             </a:r>
-            <a:endParaRPr lang="en-US" dirty="0" smtClean="0">
+            <a:endParaRPr lang="en-US" dirty="0">
               <a:sym typeface="Arial" pitchFamily="34" charset="0"/>
             </a:endParaRPr>
+          </a:p>
+        </p:txBody>
+      </p:sp>
+      <p:sp>
+        <p:nvSpPr>
+          <p:cNvPr id="5" name="Text Box 76"/>
+          <p:cNvSpPr txBox="1">
+            <a:spLocks noChangeArrowheads="1"/>
+          </p:cNvSpPr>
+          <p:nvPr/>
+        </p:nvSpPr>
+        <p:spPr bwMode="white">
+          <a:xfrm>
+            <a:off x="590550" y="9269526"/>
+            <a:ext cx="2898774" cy="200025"/>
+          </a:xfrm>
+          <a:prstGeom prst="rect">
+            <a:avLst/>
+          </a:prstGeom>
+          <a:noFill/>
+          <a:ln w="9525">
+            <a:noFill/>
+            <a:miter lim="800000"/>
+            <a:headEnd/>
+            <a:tailEnd/>
+          </a:ln>
+          <a:effectLst/>
+        </p:spPr>
+        <p:txBody>
+          <a:bodyPr lIns="0" tIns="0" rIns="0" bIns="0" anchor="ctr"/>
+          <a:lstStyle/>
+          <a:p>
+            <a:pPr defTabSz="1294318" eaLnBrk="0" hangingPunct="0">
+              <a:defRPr/>
+            </a:pPr>
+            <a:r>
+              <a:rPr lang="en-US" sz="900" baseline="0" dirty="0">
+                <a:solidFill>
+                  <a:srgbClr val="969696"/>
+                </a:solidFill>
+              </a:rPr>
+              <a:t>© 2020 Autodesk </a:t>
+            </a:r>
           </a:p>
         </p:txBody>
       </p:sp>
@@ -1819,7 +1804,7 @@
         </p:nvSpPr>
         <p:spPr>
           <a:xfrm>
-            <a:off x="5057775" y="839787"/>
+            <a:off x="5057775" y="9221787"/>
             <a:ext cx="3299301" cy="338554"/>
           </a:xfrm>
           <a:prstGeom prst="rect">
@@ -1834,14 +1819,30 @@
           <a:lstStyle/>
           <a:p>
             <a:r>
-              <a:rPr lang="en-US" sz="1600" dirty="0" smtClean="0">
+              <a:rPr lang="en-US" sz="1600" dirty="0">
                 <a:solidFill>
                   <a:schemeClr val="bg1"/>
                 </a:solidFill>
               </a:rPr>
-              <a:t>Introduction to Revit Programming</a:t>
-            </a:r>
-            <a:endParaRPr lang="en-US" sz="1600" i="1" dirty="0" smtClean="0">
+              <a:t>Introduction to </a:t>
+            </a:r>
+            <a:r>
+              <a:rPr lang="en-US" sz="1600" err="1">
+                <a:solidFill>
+                  <a:schemeClr val="bg1"/>
+                </a:solidFill>
+              </a:rPr>
+              <a:t>Revit</a:t>
+            </a:r>
+            <a:r>
+              <a:rPr lang="en-US" sz="1600">
+                <a:solidFill>
+                  <a:schemeClr val="bg1"/>
+                </a:solidFill>
+              </a:rPr>
+              <a:t> Programming</a:t>
+            </a:r>
+            <a:endParaRPr lang="en-US" sz="1600" i="1" dirty="0">
               <a:solidFill>
                 <a:schemeClr val="bg1"/>
               </a:solidFill>
@@ -1854,16 +1855,9 @@
   <p:clrMap bg1="lt1" tx1="dk1" bg2="lt2" tx2="dk2" accent1="accent1" accent2="accent2" accent3="accent3" accent4="accent4" accent5="accent5" accent6="accent6" hlink="hlink" folHlink="folHlink"/>
   <p:sldLayoutIdLst>
     <p:sldLayoutId id="2147483689" r:id="rId1"/>
-    <p:sldLayoutId id="2147483691" r:id="rId2"/>
+    <p:sldLayoutId id="2147483690" r:id="rId2"/>
   </p:sldLayoutIdLst>
   <p:transition/>
-  <p:timing>
-    <p:tnLst>
-      <p:par>
-        <p:cTn id="1" dur="indefinite" restart="never" nodeType="tmRoot"/>
-      </p:par>
-    </p:tnLst>
-  </p:timing>
   <p:txStyles>
     <p:titleStyle>
       <a:lvl1pPr algn="l" rtl="0" eaLnBrk="1" fontAlgn="base" hangingPunct="1">
@@ -2329,7 +2323,7 @@
 </file>
 
 <file path=ppt/slides/slide1.xml><?xml version="1.0" encoding="utf-8"?>
-<p:sld xmlns:a="http://schemas.openxmlformats.org/drawingml/2006/main" xmlns:r="http://schemas.openxmlformats.org/officeDocument/2006/relationships" xmlns:p="http://schemas.openxmlformats.org/presentationml/2006/main">
+<p:sld xmlns:a="http://schemas.openxmlformats.org/drawingml/2006/main" xmlns:r="http://schemas.openxmlformats.org/officeDocument/2006/relationships" xmlns:p="http://schemas.openxmlformats.org/presentationml/2006/main" showMasterSp="0">
   <p:cSld>
     <p:bg>
       <p:bgPr>
@@ -2375,7 +2369,7 @@
           </a:prstGeom>
           <a:solidFill>
             <a:schemeClr val="tx1">
-              <a:alpha val="50000"/>
+              <a:alpha val="75000"/>
             </a:schemeClr>
           </a:solidFill>
           <a:ln w="25400" cap="flat" cmpd="sng" algn="ctr">
@@ -2396,7 +2390,7 @@
           <a:lstStyle/>
           <a:p>
             <a:pPr algn="ctr" defTabSz="910302"/>
-            <a:endParaRPr lang="en-US" sz="3100" dirty="0" smtClean="0">
+            <a:endParaRPr lang="en-US" sz="3100" dirty="0">
               <a:solidFill>
                 <a:srgbClr val="000000"/>
               </a:solidFill>
@@ -2429,7 +2423,7 @@
           <a:lstStyle/>
           <a:p>
             <a:r>
-              <a:rPr lang="en-US" sz="5400" dirty="0" smtClean="0">
+              <a:rPr lang="en-US" sz="5400" dirty="0">
                 <a:solidFill>
                   <a:schemeClr val="bg1"/>
                 </a:solidFill>
@@ -2437,7 +2431,7 @@
               <a:t>Introduction to </a:t>
             </a:r>
             <a:r>
-              <a:rPr lang="en-US" sz="5400" dirty="0" err="1" smtClean="0">
+              <a:rPr lang="en-US" sz="5400" dirty="0" err="1">
                 <a:solidFill>
                   <a:schemeClr val="bg1"/>
                 </a:solidFill>
@@ -2445,7 +2439,7 @@
               <a:t>Revit</a:t>
             </a:r>
             <a:r>
-              <a:rPr lang="en-US" sz="5400" dirty="0" smtClean="0">
+              <a:rPr lang="en-US" sz="5400" dirty="0">
                 <a:solidFill>
                   <a:schemeClr val="bg1"/>
                 </a:solidFill>
@@ -2453,14 +2447,14 @@
               <a:t> Programming</a:t>
             </a:r>
             <a:br>
-              <a:rPr lang="en-US" sz="5400" dirty="0" smtClean="0">
+              <a:rPr lang="en-US" sz="5400" dirty="0">
                 <a:solidFill>
                   <a:schemeClr val="bg1"/>
                 </a:solidFill>
               </a:rPr>
             </a:br>
             <a:r>
-              <a:rPr lang="en-US" sz="3200" b="0" i="1" dirty="0" smtClean="0">
+              <a:rPr lang="en-US" sz="3200" b="0" i="1" dirty="0">
                 <a:solidFill>
                   <a:schemeClr val="bg1"/>
                 </a:solidFill>
@@ -2468,13 +2462,13 @@
               <a:t>Hands-on Training Class </a:t>
             </a:r>
             <a:br>
-              <a:rPr lang="en-US" sz="3200" b="0" i="1" dirty="0" smtClean="0">
+              <a:rPr lang="en-US" sz="3200" b="0" i="1" dirty="0">
                 <a:solidFill>
                   <a:schemeClr val="bg1"/>
                 </a:solidFill>
               </a:rPr>
             </a:br>
-            <a:endParaRPr lang="en-US" b="0" dirty="0" smtClean="0">
+            <a:endParaRPr lang="en-US" b="0" dirty="0">
               <a:solidFill>
                 <a:schemeClr val="bg1"/>
               </a:solidFill>
@@ -2509,14 +2503,22 @@
               <a:buNone/>
             </a:pPr>
             <a:r>
-              <a:rPr lang="en-US" i="1" dirty="0" smtClean="0">
+              <a:rPr lang="en-US" sz="4400" i="1" dirty="0">
                 <a:solidFill>
                   <a:schemeClr val="bg1"/>
                 </a:solidFill>
               </a:rPr>
-              <a:t> </a:t>
-            </a:r>
-            <a:endParaRPr lang="en-US" sz="2400" i="1" dirty="0" smtClean="0">
+              <a:t>Jeremy </a:t>
+            </a:r>
+            <a:r>
+              <a:rPr lang="en-US" sz="4400" i="1" dirty="0" err="1">
+                <a:solidFill>
+                  <a:schemeClr val="bg1"/>
+                </a:solidFill>
+              </a:rPr>
+              <a:t>Tammik</a:t>
+            </a:r>
+            <a:endParaRPr lang="en-US" sz="3600" i="1" dirty="0">
               <a:solidFill>
                 <a:schemeClr val="bg1"/>
               </a:solidFill>
@@ -2530,7 +2532,7 @@
               <a:buNone/>
             </a:pPr>
             <a:r>
-              <a:rPr lang="en-US" sz="2400" i="1" dirty="0" smtClean="0">
+              <a:rPr lang="en-US" sz="2400" i="1" dirty="0">
                 <a:solidFill>
                   <a:schemeClr val="bg1"/>
                 </a:solidFill>
@@ -2546,13 +2548,6 @@
     <a:masterClrMapping/>
   </p:clrMapOvr>
   <p:transition/>
-  <p:timing>
-    <p:tnLst>
-      <p:par>
-        <p:cTn id="1" dur="indefinite" restart="never" nodeType="tmRoot"/>
-      </p:par>
-    </p:tnLst>
-  </p:timing>
 </p:sld>
 </file>
 
@@ -2589,8 +2584,8 @@
           <a:lstStyle/>
           <a:p>
             <a:r>
-              <a:rPr lang="en-GB" dirty="0" smtClean="0"/>
-              <a:t>About these materials …</a:t>
+              <a:rPr lang="en-GB" dirty="0"/>
+              <a:t>About this material</a:t>
             </a:r>
           </a:p>
         </p:txBody>
@@ -2608,7 +2603,7 @@
         <p:spPr>
           <a:xfrm>
             <a:off x="593725" y="1830387"/>
-            <a:ext cx="11762080" cy="6699652"/>
+            <a:ext cx="12007850" cy="7086600"/>
           </a:xfrm>
         </p:spPr>
         <p:txBody>
@@ -2620,8 +2615,8 @@
               <a:buChar char="•"/>
             </a:pPr>
             <a:r>
-              <a:rPr lang="en-GB" sz="2400" dirty="0" smtClean="0"/>
-              <a:t>Materials provided here are from our two day classroom trainings. You can also use this for self-learning. </a:t>
+              <a:rPr lang="en-GB" sz="2400" dirty="0"/>
+              <a:t>The material provided here is from our two day classroom training. You can also use it for self-learning. </a:t>
             </a:r>
           </a:p>
           <a:p>
@@ -2629,7 +2624,7 @@
               <a:buFont typeface="Arial" pitchFamily="34" charset="0"/>
               <a:buChar char="•"/>
             </a:pPr>
-            <a:endParaRPr lang="en-GB" sz="2400" dirty="0" smtClean="0"/>
+            <a:endParaRPr lang="en-GB" sz="2400" dirty="0"/>
           </a:p>
           <a:p>
             <a:pPr>
@@ -2637,19 +2632,8 @@
               <a:buChar char="•"/>
             </a:pPr>
             <a:r>
-              <a:rPr lang="en-GB" sz="2400" dirty="0" smtClean="0"/>
-              <a:t>This is to introduce you to the fundamentals of Revit API and to get you started. </a:t>
-            </a:r>
-          </a:p>
-          <a:p>
-            <a:pPr marL="0" indent="0"/>
-            <a:r>
               <a:rPr lang="en-GB" sz="2400" dirty="0"/>
-              <a:t> </a:t>
-            </a:r>
-            <a:r>
-              <a:rPr lang="en-GB" sz="2400" dirty="0" smtClean="0"/>
-              <a:t>   (Not meant to provide a complete coverage of Revit API nor .NET Framework.) </a:t>
+              <a:t>It provides an introduction to the fundamentals of the Revit API and helps you get started. It is not meant to provide a complete coverage of the Revit API nor the .NET framework.</a:t>
             </a:r>
           </a:p>
           <a:p>
@@ -2657,7 +2641,7 @@
               <a:buFont typeface="Arial" pitchFamily="34" charset="0"/>
               <a:buChar char="•"/>
             </a:pPr>
-            <a:endParaRPr lang="en-GB" sz="2400" dirty="0" smtClean="0"/>
+            <a:endParaRPr lang="en-GB" sz="2400" dirty="0"/>
           </a:p>
           <a:p>
             <a:pPr>
@@ -2665,16 +2649,8 @@
               <a:buChar char="•"/>
             </a:pPr>
             <a:r>
-              <a:rPr lang="en-GB" sz="2400" dirty="0" smtClean="0"/>
-              <a:t>Materials are in C# and VB.NET. Lab exercises are provided in two languages. </a:t>
-            </a:r>
-            <a:r>
-              <a:rPr lang="en-GB" sz="2400" dirty="0" err="1" smtClean="0"/>
-              <a:t>Powerpoint</a:t>
-            </a:r>
-            <a:r>
-              <a:rPr lang="en-GB" sz="2400" dirty="0" smtClean="0"/>
-              <a:t> presentation is mixed. </a:t>
+              <a:rPr lang="en-GB" sz="2400" dirty="0"/>
+              <a:t>The material is provided in both C# and VB.NET. Lab exercises are provided for both languages. The PowerPoint presentation is mixed. </a:t>
             </a:r>
           </a:p>
           <a:p>
@@ -2682,7 +2658,7 @@
               <a:buFont typeface="Arial" pitchFamily="34" charset="0"/>
               <a:buChar char="•"/>
             </a:pPr>
-            <a:endParaRPr lang="en-GB" sz="2400" dirty="0" smtClean="0"/>
+            <a:endParaRPr lang="en-GB" sz="2400" dirty="0"/>
           </a:p>
           <a:p>
             <a:pPr>
@@ -2690,43 +2666,50 @@
               <a:buChar char="•"/>
             </a:pPr>
             <a:r>
-              <a:rPr lang="en-GB" sz="2400" dirty="0" smtClean="0"/>
-              <a:t>Disclaimer: We are aware that materials are not free of errors. We intend to correct them as we encounter. We hope this will still be useful for you to get started with Revit API programming. </a:t>
-            </a:r>
-          </a:p>
-          <a:p>
-            <a:endParaRPr lang="en-GB" sz="2400" dirty="0" smtClean="0"/>
+              <a:rPr lang="en-GB" sz="2400" dirty="0"/>
+              <a:t>Disclaimer: We are aware that this material is not error free and are happy to correct it as we go along. We hope this will still be useful for you to get started with Revit API programming. </a:t>
+            </a:r>
+          </a:p>
+          <a:p>
+            <a:endParaRPr lang="en-GB" sz="2400" dirty="0"/>
           </a:p>
           <a:p>
             <a:pPr algn="ctr"/>
             <a:r>
-              <a:rPr lang="en-GB" sz="2400" dirty="0" smtClean="0"/>
+              <a:rPr lang="en-GB" sz="2400" dirty="0"/>
               <a:t>Good luck!  </a:t>
             </a:r>
           </a:p>
           <a:p>
             <a:pPr algn="r"/>
             <a:r>
-              <a:rPr lang="en-GB" sz="2000" dirty="0" smtClean="0"/>
+              <a:rPr lang="en-GB" sz="2000" dirty="0"/>
               <a:t>AEC workgroup </a:t>
             </a:r>
           </a:p>
           <a:p>
             <a:pPr algn="r"/>
             <a:r>
-              <a:rPr lang="en-GB" sz="2000" dirty="0" smtClean="0"/>
+              <a:rPr lang="en-GB" sz="2000" dirty="0"/>
               <a:t>Developer Technical Services</a:t>
             </a:r>
           </a:p>
           <a:p>
             <a:pPr algn="r"/>
             <a:r>
-              <a:rPr lang="en-GB" sz="2000" dirty="0" smtClean="0"/>
-              <a:t>Autodesk Developer Network </a:t>
-            </a:r>
-          </a:p>
-          <a:p>
-            <a:endParaRPr lang="en-US" sz="2400" dirty="0" smtClean="0"/>
+              <a:rPr lang="en-GB" sz="2000" dirty="0"/>
+              <a:t>Autodesk Developer Network</a:t>
+            </a:r>
+          </a:p>
+          <a:p>
+            <a:pPr algn="r"/>
+            <a:r>
+              <a:rPr lang="en-GB" sz="2000" dirty="0"/>
+              <a:t>March 2013 </a:t>
+            </a:r>
+          </a:p>
+          <a:p>
+            <a:endParaRPr lang="en-US" sz="2400" dirty="0"/>
           </a:p>
         </p:txBody>
       </p:sp>
@@ -2736,13 +2719,6 @@
     <a:masterClrMapping/>
   </p:clrMapOvr>
   <p:transition/>
-  <p:timing>
-    <p:tnLst>
-      <p:par>
-        <p:cTn id="1" dur="indefinite" restart="never" nodeType="tmRoot"/>
-      </p:par>
-    </p:tnLst>
-  </p:timing>
 </p:sld>
 </file>
 
@@ -2779,7 +2755,7 @@
           <a:lstStyle/>
           <a:p>
             <a:r>
-              <a:rPr lang="en-GB" smtClean="0"/>
+              <a:rPr lang="en-GB"/>
               <a:t>Agenda</a:t>
             </a:r>
           </a:p>
@@ -2806,89 +2782,81 @@
           <a:lstStyle/>
           <a:p>
             <a:r>
-              <a:rPr lang="en-GB" sz="2800" dirty="0" smtClean="0"/>
+              <a:rPr lang="en-GB" sz="2800" dirty="0"/>
               <a:t>Day 1: Overview and </a:t>
             </a:r>
             <a:r>
-              <a:rPr lang="en-GB" sz="2800" dirty="0" err="1" smtClean="0"/>
+              <a:rPr lang="en-GB" sz="2800" dirty="0" err="1"/>
               <a:t>Revit</a:t>
             </a:r>
             <a:r>
-              <a:rPr lang="en-GB" sz="2800" dirty="0" smtClean="0"/>
+              <a:rPr lang="en-GB" sz="2800" dirty="0"/>
               <a:t> database basics</a:t>
             </a:r>
           </a:p>
           <a:p>
             <a:pPr lvl="1"/>
             <a:r>
-              <a:rPr lang="en-GB" sz="2400" dirty="0" smtClean="0"/>
-              <a:t>External command, external application, more </a:t>
-            </a:r>
-            <a:r>
-              <a:rPr lang="en-GB" sz="2400" dirty="0" err="1" smtClean="0"/>
+              <a:rPr lang="en-GB" sz="2400" dirty="0"/>
+              <a:t>External command, external application, </a:t>
+            </a:r>
+            <a:r>
+              <a:rPr lang="en-GB" sz="2400" dirty="0" err="1"/>
               <a:t>RevitLookup</a:t>
             </a:r>
             <a:r>
-              <a:rPr lang="en-GB" sz="2400" dirty="0" smtClean="0"/>
+              <a:rPr lang="en-GB" sz="2400" dirty="0"/>
               <a:t> and </a:t>
             </a:r>
             <a:r>
-              <a:rPr lang="en-GB" sz="2400" dirty="0" err="1" smtClean="0"/>
+              <a:rPr lang="en-GB" sz="2400" dirty="0" err="1"/>
               <a:t>RvtSamples</a:t>
             </a:r>
             <a:r>
-              <a:rPr lang="en-GB" sz="2400" dirty="0" smtClean="0"/>
-              <a:t>, understanding the </a:t>
-            </a:r>
-            <a:r>
-              <a:rPr lang="en-GB" sz="2400" dirty="0" err="1" smtClean="0"/>
+              <a:rPr lang="en-GB" sz="2400" dirty="0"/>
+              <a:t>, understanding the Revit Element class, filtered element collector, object creation and modification</a:t>
+            </a:r>
+            <a:br>
+              <a:rPr lang="en-GB" sz="2400" dirty="0"/>
+            </a:br>
+            <a:endParaRPr lang="en-GB" sz="2400" dirty="0"/>
+          </a:p>
+          <a:p>
+            <a:r>
+              <a:rPr lang="en-GB" sz="2800" dirty="0"/>
+              <a:t>Day 2</a:t>
+            </a:r>
+          </a:p>
+          <a:p>
+            <a:pPr lvl="1"/>
+            <a:r>
+              <a:rPr lang="en-GB" sz="2400" dirty="0" err="1"/>
               <a:t>Revit</a:t>
             </a:r>
             <a:r>
-              <a:rPr lang="en-GB" sz="2400" dirty="0" smtClean="0"/>
-              <a:t> Element class, filtered element collector, object creation and modification</a:t>
-            </a:r>
-            <a:br>
-              <a:rPr lang="en-GB" sz="2400" dirty="0" smtClean="0"/>
-            </a:br>
-            <a:endParaRPr lang="en-GB" sz="2400" dirty="0" smtClean="0"/>
-          </a:p>
-          <a:p>
-            <a:r>
-              <a:rPr lang="en-GB" sz="2800" dirty="0" smtClean="0"/>
-              <a:t>Day 2</a:t>
+              <a:rPr lang="en-GB" sz="2400" dirty="0"/>
+              <a:t> UI basics: ribbon, dialog, selection, events</a:t>
             </a:r>
           </a:p>
           <a:p>
             <a:pPr lvl="1"/>
             <a:r>
-              <a:rPr lang="en-GB" sz="2400" dirty="0" err="1" smtClean="0"/>
-              <a:t>Revit</a:t>
-            </a:r>
-            <a:r>
-              <a:rPr lang="en-GB" sz="2400" dirty="0" smtClean="0"/>
-              <a:t> UI basics: ribbon, dialog, selection, events</a:t>
+              <a:rPr lang="en-GB" sz="2400" dirty="0"/>
+              <a:t>Family API</a:t>
             </a:r>
           </a:p>
           <a:p>
             <a:pPr lvl="1"/>
             <a:r>
-              <a:rPr lang="en-GB" sz="2400" dirty="0" smtClean="0"/>
-              <a:t>Family API</a:t>
-            </a:r>
-          </a:p>
-          <a:p>
-            <a:pPr lvl="1"/>
-            <a:r>
-              <a:rPr lang="en-GB" sz="2400" dirty="0" smtClean="0"/>
+              <a:rPr lang="en-GB" sz="2400" dirty="0"/>
               <a:t>Advanced topics</a:t>
             </a:r>
           </a:p>
           <a:p>
             <a:pPr lvl="2"/>
             <a:r>
-              <a:rPr lang="en-US" sz="2000" dirty="0" smtClean="0"/>
-              <a:t>Extended storage</a:t>
+              <a:rPr lang="en-US" sz="2000" dirty="0"/>
+              <a:t>Extensible storage</a:t>
             </a:r>
           </a:p>
           <a:p>
@@ -2898,14 +2866,14 @@
               </a:spcBef>
             </a:pPr>
             <a:r>
-              <a:rPr lang="en-US" sz="2000" dirty="0" smtClean="0"/>
+              <a:rPr lang="en-US" sz="2000" dirty="0"/>
               <a:t>Custom data in shared parameters: </a:t>
             </a:r>
             <a:r>
-              <a:rPr lang="en-US" sz="2000" dirty="0" err="1" smtClean="0"/>
+              <a:rPr lang="en-US" sz="2000" dirty="0" err="1"/>
               <a:t>FireRating</a:t>
             </a:r>
-            <a:endParaRPr lang="en-US" sz="2000" dirty="0" smtClean="0"/>
+            <a:endParaRPr lang="en-US" sz="2000" dirty="0"/>
           </a:p>
           <a:p>
             <a:pPr lvl="2">
@@ -2914,18 +2882,18 @@
               </a:spcBef>
             </a:pPr>
             <a:r>
-              <a:rPr lang="en-US" sz="2000" dirty="0" err="1" smtClean="0"/>
+              <a:rPr lang="en-US" sz="2000" dirty="0" err="1"/>
               <a:t>DocumentChanged</a:t>
             </a:r>
             <a:r>
-              <a:rPr lang="en-US" sz="2000" dirty="0" smtClean="0"/>
+              <a:rPr lang="en-US" sz="2000" dirty="0"/>
               <a:t> event: </a:t>
             </a:r>
             <a:r>
-              <a:rPr lang="en-US" sz="2000" dirty="0" err="1" smtClean="0"/>
+              <a:rPr lang="en-US" sz="2000" dirty="0" err="1"/>
               <a:t>ChangesMonitor</a:t>
             </a:r>
-            <a:endParaRPr lang="en-US" sz="2000" dirty="0" smtClean="0"/>
+            <a:endParaRPr lang="en-US" sz="2000" dirty="0"/>
           </a:p>
           <a:p>
             <a:pPr lvl="2">
@@ -2934,22 +2902,22 @@
               </a:spcBef>
             </a:pPr>
             <a:r>
-              <a:rPr lang="en-US" sz="2000" dirty="0" smtClean="0"/>
+              <a:rPr lang="en-US" sz="2000" dirty="0"/>
               <a:t>Dynamic Model Update (DMU): </a:t>
             </a:r>
             <a:r>
-              <a:rPr lang="en-US" sz="2000" dirty="0" err="1" smtClean="0"/>
+              <a:rPr lang="en-US" sz="2000" dirty="0" err="1"/>
               <a:t>DynamicModelUpdate</a:t>
             </a:r>
             <a:r>
-              <a:rPr lang="en-US" sz="2000" dirty="0" smtClean="0"/>
+              <a:rPr lang="en-US" sz="2000" dirty="0"/>
               <a:t> and </a:t>
             </a:r>
             <a:r>
-              <a:rPr lang="en-US" sz="2000" dirty="0" err="1" smtClean="0"/>
+              <a:rPr lang="en-US" sz="2000" dirty="0" err="1"/>
               <a:t>DistanceToSurfaces</a:t>
             </a:r>
-            <a:endParaRPr lang="en-US" sz="2000" dirty="0" smtClean="0"/>
+            <a:endParaRPr lang="en-US" sz="2000" dirty="0"/>
           </a:p>
           <a:p>
             <a:pPr lvl="2">
@@ -2958,30 +2926,30 @@
               </a:spcBef>
             </a:pPr>
             <a:r>
-              <a:rPr lang="en-US" sz="2000" dirty="0" smtClean="0"/>
+              <a:rPr lang="en-US" sz="2000" dirty="0"/>
               <a:t>Analysis </a:t>
             </a:r>
             <a:r>
-              <a:rPr lang="en-US" sz="2000" dirty="0" err="1" smtClean="0"/>
+              <a:rPr lang="en-US" sz="2000" dirty="0" err="1"/>
               <a:t>Visualisation</a:t>
             </a:r>
             <a:r>
-              <a:rPr lang="en-US" sz="2000" dirty="0" smtClean="0"/>
+              <a:rPr lang="en-US" sz="2000" dirty="0"/>
               <a:t> Framework (AVF): </a:t>
             </a:r>
             <a:r>
-              <a:rPr lang="en-US" sz="2000" dirty="0" err="1" smtClean="0"/>
+              <a:rPr lang="en-US" sz="2000" dirty="0" err="1"/>
               <a:t>DistanceToSurfaces</a:t>
             </a:r>
             <a:r>
-              <a:rPr lang="en-US" sz="2000" dirty="0" smtClean="0"/>
+              <a:rPr lang="en-US" sz="2000" dirty="0"/>
               <a:t> and </a:t>
             </a:r>
             <a:r>
-              <a:rPr lang="en-US" sz="2000" dirty="0" err="1" smtClean="0"/>
+              <a:rPr lang="en-US" sz="2000" dirty="0" err="1"/>
               <a:t>SpatialFieldGradient</a:t>
             </a:r>
-            <a:endParaRPr lang="en-US" sz="2000" dirty="0" smtClean="0"/>
+            <a:endParaRPr lang="en-US" sz="2000" dirty="0"/>
           </a:p>
         </p:txBody>
       </p:sp>
@@ -2991,13 +2959,6 @@
     <a:masterClrMapping/>
   </p:clrMapOvr>
   <p:transition/>
-  <p:timing>
-    <p:tnLst>
-      <p:par>
-        <p:cTn id="1" dur="indefinite" restart="never" nodeType="tmRoot"/>
-      </p:par>
-    </p:tnLst>
-  </p:timing>
 </p:sld>
 </file>
 
@@ -3039,14 +3000,13 @@
           <a:lstStyle/>
           <a:p>
             <a:r>
-              <a:rPr lang="en-US" dirty="0" err="1" smtClean="0"/>
+              <a:rPr lang="en-US" dirty="0" err="1"/>
               <a:t>Revit</a:t>
             </a:r>
             <a:r>
-              <a:rPr lang="en-US" dirty="0" smtClean="0"/>
+              <a:rPr lang="en-US" dirty="0"/>
               <a:t> API Intro Labs  </a:t>
             </a:r>
-            <a:endParaRPr lang="en-US" dirty="0"/>
           </a:p>
         </p:txBody>
       </p:sp>
@@ -3071,125 +3031,121 @@
           <a:lstStyle/>
           <a:p>
             <a:r>
-              <a:rPr lang="en-US" dirty="0" err="1" smtClean="0"/>
+              <a:rPr lang="en-US" dirty="0" err="1"/>
               <a:t>Revit</a:t>
             </a:r>
             <a:r>
-              <a:rPr lang="en-US" dirty="0" smtClean="0"/>
+              <a:rPr lang="en-US" dirty="0"/>
               <a:t> API fundamentals </a:t>
             </a:r>
           </a:p>
           <a:p>
             <a:pPr lvl="1"/>
             <a:r>
-              <a:rPr lang="en-US" dirty="0" err="1" smtClean="0"/>
+              <a:rPr lang="en-US" dirty="0"/>
+              <a:t>Revit add-ins: external command and application, attributes, add-in manifest and object model </a:t>
+            </a:r>
+          </a:p>
+          <a:p>
+            <a:pPr lvl="1"/>
+            <a:r>
+              <a:rPr lang="en-US" dirty="0"/>
+              <a:t>Representation of </a:t>
+            </a:r>
+            <a:r>
+              <a:rPr lang="en-US" dirty="0" err="1"/>
               <a:t>Revit</a:t>
             </a:r>
             <a:r>
-              <a:rPr lang="en-US" dirty="0" smtClean="0"/>
-              <a:t> Add-ins: external command/application, attributes, add-in manifest and object model </a:t>
+              <a:rPr lang="en-US" dirty="0"/>
+              <a:t> elements  </a:t>
             </a:r>
           </a:p>
           <a:p>
             <a:pPr lvl="1"/>
             <a:r>
-              <a:rPr lang="en-US" dirty="0" smtClean="0"/>
-              <a:t>Representation of </a:t>
-            </a:r>
-            <a:r>
-              <a:rPr lang="en-US" dirty="0" err="1" smtClean="0"/>
-              <a:t>Revit</a:t>
-            </a:r>
-            <a:r>
-              <a:rPr lang="en-US" dirty="0" smtClean="0"/>
-              <a:t> elements  </a:t>
+              <a:rPr lang="en-US" dirty="0"/>
+              <a:t>Element filtering and queries </a:t>
             </a:r>
           </a:p>
           <a:p>
             <a:pPr lvl="1"/>
             <a:r>
-              <a:rPr lang="en-US" dirty="0" smtClean="0"/>
-              <a:t>Element filtering and queries </a:t>
+              <a:rPr lang="en-US" dirty="0"/>
+              <a:t>Element modification</a:t>
             </a:r>
           </a:p>
           <a:p>
             <a:pPr lvl="1"/>
             <a:r>
-              <a:rPr lang="en-US" dirty="0" smtClean="0"/>
-              <a:t>Element modification</a:t>
+              <a:rPr lang="en-US" dirty="0"/>
+              <a:t>Model creation </a:t>
             </a:r>
           </a:p>
           <a:p>
             <a:pPr lvl="1"/>
             <a:r>
-              <a:rPr lang="en-US" dirty="0" smtClean="0"/>
-              <a:t>Model creation </a:t>
+              <a:rPr lang="en-US" dirty="0"/>
+              <a:t>Application own data</a:t>
+            </a:r>
+          </a:p>
+          <a:p>
+            <a:r>
+              <a:rPr lang="en-US" dirty="0"/>
+              <a:t>Exercises</a:t>
             </a:r>
           </a:p>
           <a:p>
             <a:pPr lvl="1"/>
             <a:r>
-              <a:rPr lang="en-US" dirty="0" smtClean="0"/>
-              <a:t>Application own data</a:t>
-            </a:r>
-          </a:p>
-          <a:p>
-            <a:r>
-              <a:rPr lang="en-US" dirty="0" smtClean="0"/>
-              <a:t>Exercises</a:t>
+              <a:rPr lang="en-US" dirty="0"/>
+              <a:t>Lab1 – “Hello World”</a:t>
             </a:r>
           </a:p>
           <a:p>
             <a:pPr lvl="1"/>
             <a:r>
-              <a:rPr lang="en-US" dirty="0" smtClean="0"/>
-              <a:t>Lab1 – “Hello World”</a:t>
+              <a:rPr lang="en-US" dirty="0"/>
+              <a:t>Lab2 – DB Element  </a:t>
             </a:r>
           </a:p>
           <a:p>
             <a:pPr lvl="1"/>
             <a:r>
-              <a:rPr lang="en-US" dirty="0" smtClean="0"/>
-              <a:t>Lab2 – DB Element  </a:t>
+              <a:rPr lang="en-US" dirty="0"/>
+              <a:t>Lab3 – Element Filtering </a:t>
             </a:r>
           </a:p>
           <a:p>
             <a:pPr lvl="1"/>
             <a:r>
-              <a:rPr lang="en-US" dirty="0" smtClean="0"/>
-              <a:t>Lab3 – Element Filtering </a:t>
+              <a:rPr lang="en-US" dirty="0"/>
+              <a:t>Lab4 – Element Modification </a:t>
             </a:r>
           </a:p>
           <a:p>
             <a:pPr lvl="1"/>
             <a:r>
-              <a:rPr lang="en-US" dirty="0" smtClean="0"/>
-              <a:t>Lab4 – Element Modification </a:t>
+              <a:rPr lang="en-US" dirty="0"/>
+              <a:t>Lab5 – Model Creation </a:t>
             </a:r>
           </a:p>
           <a:p>
             <a:pPr lvl="1"/>
             <a:r>
-              <a:rPr lang="en-US" dirty="0" smtClean="0"/>
-              <a:t>Lab5 – Model Creation </a:t>
+              <a:rPr lang="en-US" dirty="0"/>
+              <a:t>Lab6 – Extensible Storage</a:t>
             </a:r>
           </a:p>
           <a:p>
             <a:pPr lvl="1"/>
             <a:r>
-              <a:rPr lang="en-US" dirty="0" smtClean="0"/>
-              <a:t>Lab6 – Extensible Storage</a:t>
-            </a:r>
-          </a:p>
-          <a:p>
-            <a:pPr lvl="1"/>
-            <a:r>
-              <a:rPr lang="en-US" dirty="0" smtClean="0"/>
+              <a:rPr lang="en-US" dirty="0"/>
               <a:t>Lab7 – Shared Parameter</a:t>
             </a:r>
           </a:p>
           <a:p>
-            <a:endParaRPr lang="en-US" dirty="0" smtClean="0"/>
+            <a:endParaRPr lang="en-US" dirty="0"/>
           </a:p>
           <a:p>
             <a:endParaRPr lang="en-US" dirty="0"/>
@@ -3202,13 +3158,6 @@
     <a:masterClrMapping/>
   </p:clrMapOvr>
   <p:transition/>
-  <p:timing>
-    <p:tnLst>
-      <p:par>
-        <p:cTn id="1" dur="indefinite" restart="never" nodeType="tmRoot"/>
-      </p:par>
-    </p:tnLst>
-  </p:timing>
 </p:sld>
 </file>
 
@@ -3229,17 +3178,43 @@
           <a:chExt cx="0" cy="0"/>
         </a:xfrm>
       </p:grpSpPr>
+      <p:sp>
+        <p:nvSpPr>
+          <p:cNvPr id="3" name="Text Placeholder 2"/>
+          <p:cNvSpPr>
+            <a:spLocks noGrp="1"/>
+          </p:cNvSpPr>
+          <p:nvPr>
+            <p:ph type="body" sz="quarter" idx="12"/>
+          </p:nvPr>
+        </p:nvSpPr>
+        <p:spPr>
+          <a:xfrm>
+            <a:off x="105452" y="8251100"/>
+            <a:ext cx="12798977" cy="589687"/>
+          </a:xfrm>
+        </p:spPr>
+        <p:txBody>
+          <a:bodyPr/>
+          <a:lstStyle/>
+          <a:p>
+            <a:r>
+              <a:rPr lang="en-US" dirty="0"/>
+              <a:t>Autodesk is a registered trademark of Autodesk, Inc., and/or its subsidiaries and/or affiliates in the USA and/or other countries. All other brand names, product names, or trademarks belong to their respective holders. Autodesk reserves the right to alter product and services offerings, and specifications and pricing at any time without notice, and is not responsible for typographical or graphical errors that may appear in this document.</a:t>
+            </a:r>
+          </a:p>
+        </p:txBody>
+      </p:sp>
     </p:spTree>
     <p:extLst>
       <p:ext uri="{BB962C8B-B14F-4D97-AF65-F5344CB8AC3E}">
-        <p14:creationId xmlns:p14="http://schemas.microsoft.com/office/powerpoint/2010/main" val="2171921212"/>
+        <p14:creationId xmlns:p14="http://schemas.microsoft.com/office/powerpoint/2010/main" val="2751651292"/>
       </p:ext>
     </p:extLst>
   </p:cSld>
   <p:clrMapOvr>
     <a:masterClrMapping/>
   </p:clrMapOvr>
-  <p:transition/>
 </p:sld>
 </file>
 
@@ -4208,6 +4183,30 @@
 </file>
 
 <file path=customXml/item1.xml><?xml version="1.0" encoding="utf-8"?>
+<?mso-contentType ?>
+<FormTemplates xmlns="http://schemas.microsoft.com/sharepoint/v3/contenttype/forms">
+  <Display>DocumentLibraryForm</Display>
+  <Edit>DocumentLibraryForm</Edit>
+  <New>DocumentLibraryForm</New>
+</FormTemplates>
+</file>
+
+<file path=customXml/item2.xml><?xml version="1.0" encoding="utf-8"?>
+<p:properties xmlns:p="http://schemas.microsoft.com/office/2006/metadata/properties" xmlns:xsi="http://www.w3.org/2001/XMLSchema-instance">
+  <documentManagement>
+    <Image xmlns="f53a3603-67ad-45e2-accf-d44f8756b321">
+      <Url>https://share.autodesk.com/Marketing/catalog/PublishingImages/09_25_08_AEC_Title_01.jpg</Url>
+      <Description xsi:nil="true"/>
+    </Image>
+    <Date_x0020_Published xmlns="c8bab806-ca78-4cad-94f6-48e563f76e95">2009-05-14T07:00:00+00:00</Date_x0020_Published>
+    <Media_x0020_Description xmlns="c8bab806-ca78-4cad-94f6-48e563f76e95">AEC Industry Title Slide -- General Overview Version</Media_x0020_Description>
+    <Category xmlns="f53a3603-67ad-45e2-accf-d44f8756b321" xsi:nil="true"/>
+    <Business_x0020_and_x0020_Industry xmlns="f53a3603-67ad-45e2-accf-d44f8756b321">Industry PowerPoint Title Slides</Business_x0020_and_x0020_Industry>
+  </documentManagement>
+</p:properties>
+</file>
+
+<file path=customXml/item3.xml><?xml version="1.0" encoding="utf-8"?>
 <ct:contentTypeSchema xmlns:ct="http://schemas.microsoft.com/office/2006/metadata/contentType" xmlns:ma="http://schemas.microsoft.com/office/2006/metadata/properties/metaAttributes" ct:_="" ma:_="" ma:contentTypeName="Creative Catalog" ma:contentTypeID="0x0101003D62B9A716C08244A68E1D56ED354A9500A7EFD4C2F324CA44B4E995A506E2E1CF" ma:contentTypeVersion="31" ma:contentTypeDescription="" ma:contentTypeScope="" ma:versionID="17bc19fc9bd490bc1bda444d86d6b7f0">
   <xsd:schema xmlns:xsd="http://www.w3.org/2001/XMLSchema" xmlns:p="http://schemas.microsoft.com/office/2006/metadata/properties" xmlns:ns2="c8bab806-ca78-4cad-94f6-48e563f76e95" xmlns:ns4="f53a3603-67ad-45e2-accf-d44f8756b321" targetNamespace="http://schemas.microsoft.com/office/2006/metadata/properties" ma:root="true" ma:fieldsID="284905265c583129f8035dc0f09dfb0f" ns2:_="" ns4:_="">
     <xsd:import namespace="c8bab806-ca78-4cad-94f6-48e563f76e95"/>
@@ -4306,31 +4305,31 @@
 </ct:contentTypeSchema>
 </file>
 
-<file path=customXml/item2.xml><?xml version="1.0" encoding="utf-8"?>
-<?mso-contentType ?>
-<FormTemplates xmlns="http://schemas.microsoft.com/sharepoint/v3/contenttype/forms">
-  <Display>DocumentLibraryForm</Display>
-  <Edit>DocumentLibraryForm</Edit>
-  <New>DocumentLibraryForm</New>
-</FormTemplates>
+<file path=customXml/itemProps1.xml><?xml version="1.0" encoding="utf-8"?>
+<ds:datastoreItem xmlns:ds="http://schemas.openxmlformats.org/officeDocument/2006/customXml" ds:itemID="{1B23F64D-CA4A-4BF5-9636-FF31814D07BC}">
+  <ds:schemaRefs>
+    <ds:schemaRef ds:uri="http://schemas.microsoft.com/sharepoint/v3/contenttype/forms"/>
+  </ds:schemaRefs>
+</ds:datastoreItem>
 </file>
 
-<file path=customXml/item3.xml><?xml version="1.0" encoding="utf-8"?>
-<p:properties xmlns:p="http://schemas.microsoft.com/office/2006/metadata/properties" xmlns:xsi="http://www.w3.org/2001/XMLSchema-instance">
-  <documentManagement>
-    <Image xmlns="f53a3603-67ad-45e2-accf-d44f8756b321">
-      <Url>https://share.autodesk.com/Marketing/catalog/PublishingImages/09_25_08_AEC_Title_01.jpg</Url>
-      <Description xsi:nil="true"/>
-    </Image>
-    <Date_x0020_Published xmlns="c8bab806-ca78-4cad-94f6-48e563f76e95">2009-05-14T07:00:00+00:00</Date_x0020_Published>
-    <Media_x0020_Description xmlns="c8bab806-ca78-4cad-94f6-48e563f76e95">AEC Industry Title Slide -- General Overview Version</Media_x0020_Description>
-    <Category xmlns="f53a3603-67ad-45e2-accf-d44f8756b321" xsi:nil="true"/>
-    <Business_x0020_and_x0020_Industry xmlns="f53a3603-67ad-45e2-accf-d44f8756b321">Industry PowerPoint Title Slides</Business_x0020_and_x0020_Industry>
-  </documentManagement>
-</p:properties>
+<file path=customXml/itemProps2.xml><?xml version="1.0" encoding="utf-8"?>
+<ds:datastoreItem xmlns:ds="http://schemas.openxmlformats.org/officeDocument/2006/customXml" ds:itemID="{6307AE55-A139-4AD7-ACEE-00E455099D23}">
+  <ds:schemaRefs>
+    <ds:schemaRef ds:uri="http://purl.org/dc/dcmitype/"/>
+    <ds:schemaRef ds:uri="http://schemas.microsoft.com/office/2006/metadata/properties"/>
+    <ds:schemaRef ds:uri="http://schemas.microsoft.com/office/2006/documentManagement/types"/>
+    <ds:schemaRef ds:uri="http://www.w3.org/XML/1998/namespace"/>
+    <ds:schemaRef ds:uri="f53a3603-67ad-45e2-accf-d44f8756b321"/>
+    <ds:schemaRef ds:uri="http://schemas.openxmlformats.org/package/2006/metadata/core-properties"/>
+    <ds:schemaRef ds:uri="c8bab806-ca78-4cad-94f6-48e563f76e95"/>
+    <ds:schemaRef ds:uri="http://purl.org/dc/terms/"/>
+    <ds:schemaRef ds:uri="http://purl.org/dc/elements/1.1/"/>
+  </ds:schemaRefs>
+</ds:datastoreItem>
 </file>
 
-<file path=customXml/itemProps1.xml><?xml version="1.0" encoding="utf-8"?>
+<file path=customXml/itemProps3.xml><?xml version="1.0" encoding="utf-8"?>
 <ds:datastoreItem xmlns:ds="http://schemas.openxmlformats.org/officeDocument/2006/customXml" ds:itemID="{A9644739-F05B-4EE2-A361-57034C614130}">
   <ds:schemaRefs>
     <ds:schemaRef ds:uri="http://schemas.microsoft.com/office/2006/metadata/contentType"/>
@@ -4346,28 +4345,4 @@
     <ds:schemaRef ds:uri="http://schemas.microsoft.com/office/internal/2005/internalDocumentation"/>
   </ds:schemaRefs>
 </ds:datastoreItem>
-</file>
-
-<file path=customXml/itemProps2.xml><?xml version="1.0" encoding="utf-8"?>
-<ds:datastoreItem xmlns:ds="http://schemas.openxmlformats.org/officeDocument/2006/customXml" ds:itemID="{1B23F64D-CA4A-4BF5-9636-FF31814D07BC}">
-  <ds:schemaRefs>
-    <ds:schemaRef ds:uri="http://schemas.microsoft.com/sharepoint/v3/contenttype/forms"/>
-  </ds:schemaRefs>
-</ds:datastoreItem>
-</file>
-
-<file path=customXml/itemProps3.xml><?xml version="1.0" encoding="utf-8"?>
-<ds:datastoreItem xmlns:ds="http://schemas.openxmlformats.org/officeDocument/2006/customXml" ds:itemID="{6307AE55-A139-4AD7-ACEE-00E455099D23}">
-  <ds:schemaRefs>
-    <ds:schemaRef ds:uri="http://purl.org/dc/dcmitype/"/>
-    <ds:schemaRef ds:uri="http://schemas.microsoft.com/office/2006/metadata/properties"/>
-    <ds:schemaRef ds:uri="http://schemas.microsoft.com/office/2006/documentManagement/types"/>
-    <ds:schemaRef ds:uri="http://www.w3.org/XML/1998/namespace"/>
-    <ds:schemaRef ds:uri="f53a3603-67ad-45e2-accf-d44f8756b321"/>
-    <ds:schemaRef ds:uri="http://schemas.openxmlformats.org/package/2006/metadata/core-properties"/>
-    <ds:schemaRef ds:uri="c8bab806-ca78-4cad-94f6-48e563f76e95"/>
-    <ds:schemaRef ds:uri="http://purl.org/dc/terms/"/>
-    <ds:schemaRef ds:uri="http://purl.org/dc/elements/1.1/"/>
-  </ds:schemaRefs>
-</ds:datastoreItem>
 </file>
</xml_diff>